<commit_message>
Minor change: added my last name ;)
</commit_message>
<xml_diff>
--- a/Additional_Material/2017-04-25 Data Mining II Intermediate Presentation_v5.pptx
+++ b/Additional_Material/2017-04-25 Data Mining II Intermediate Presentation_v5.pptx
@@ -506,7 +506,7 @@
               <a:pPr>
                 <a:defRPr/>
               </a:pPr>
-              <a:t>‹#›</a:t>
+              <a:t>‹Nr.›</a:t>
             </a:fld>
             <a:endParaRPr lang="en-US"/>
           </a:p>
@@ -675,7 +675,7 @@
           </a:ln>
           <a:extLst>
             <a:ext uri="{909E8E84-426E-40dd-AFC4-6F175D3DCCD1}">
-              <a14:hiddenFill xmlns:a14="http://schemas.microsoft.com/office/drawing/2010/main" xmlns="">
+              <a14:hiddenFill xmlns="" xmlns:a14="http://schemas.microsoft.com/office/drawing/2010/main">
                 <a:solidFill>
                   <a:srgbClr val="FFFFFF"/>
                 </a:solidFill>
@@ -854,7 +854,7 @@
               <a:pPr>
                 <a:defRPr/>
               </a:pPr>
-              <a:t>‹#›</a:t>
+              <a:t>‹Nr.›</a:t>
             </a:fld>
             <a:endParaRPr lang="de-DE"/>
           </a:p>
@@ -1405,14 +1405,14 @@
           </a:ln>
           <a:extLst>
             <a:ext uri="{909E8E84-426E-40dd-AFC4-6F175D3DCCD1}">
-              <a14:hiddenFill xmlns:a14="http://schemas.microsoft.com/office/drawing/2010/main" xmlns="">
+              <a14:hiddenFill xmlns="" xmlns:a14="http://schemas.microsoft.com/office/drawing/2010/main">
                 <a:solidFill>
                   <a:srgbClr val="FFFFFF"/>
                 </a:solidFill>
               </a14:hiddenFill>
             </a:ext>
             <a:ext uri="{91240B29-F687-4f45-9708-019B960494DF}">
-              <a14:hiddenLine xmlns:a14="http://schemas.microsoft.com/office/drawing/2010/main" xmlns="" w="9525">
+              <a14:hiddenLine xmlns="" xmlns:a14="http://schemas.microsoft.com/office/drawing/2010/main" w="9525">
                 <a:solidFill>
                   <a:srgbClr val="000000"/>
                 </a:solidFill>
@@ -1450,7 +1450,7 @@
           </a:ln>
           <a:extLst>
             <a:ext uri="{91240B29-F687-4f45-9708-019B960494DF}">
-              <a14:hiddenLine xmlns:a14="http://schemas.microsoft.com/office/drawing/2010/main" xmlns="" w="9525">
+              <a14:hiddenLine xmlns="" xmlns:a14="http://schemas.microsoft.com/office/drawing/2010/main" w="9525">
                 <a:solidFill>
                   <a:srgbClr val="000000"/>
                 </a:solidFill>
@@ -1569,14 +1569,14 @@
           </a:prstGeom>
           <a:extLst>
             <a:ext uri="{909E8E84-426E-40dd-AFC4-6F175D3DCCD1}">
-              <a14:hiddenFill xmlns:a14="http://schemas.microsoft.com/office/drawing/2010/main" xmlns="">
+              <a14:hiddenFill xmlns="" xmlns:a14="http://schemas.microsoft.com/office/drawing/2010/main">
                 <a:solidFill>
                   <a:schemeClr val="accent1"/>
                 </a:solidFill>
               </a14:hiddenFill>
             </a:ext>
             <a:ext uri="{91240B29-F687-4f45-9708-019B960494DF}">
-              <a14:hiddenLine xmlns:a14="http://schemas.microsoft.com/office/drawing/2010/main" xmlns="" w="9525">
+              <a14:hiddenLine xmlns="" xmlns:a14="http://schemas.microsoft.com/office/drawing/2010/main" w="9525">
                 <a:solidFill>
                   <a:schemeClr val="tx1"/>
                 </a:solidFill>
@@ -1586,7 +1586,7 @@
               </a14:hiddenLine>
             </a:ext>
             <a:ext uri="{AF507438-7753-43e0-B8FC-AC1667EBCBE1}">
-              <a14:hiddenEffects xmlns:a14="http://schemas.microsoft.com/office/drawing/2010/main" xmlns="">
+              <a14:hiddenEffects xmlns="" xmlns:a14="http://schemas.microsoft.com/office/drawing/2010/main">
                 <a:effectLst>
                   <a:outerShdw dist="35921" dir="2700000" algn="ctr" rotWithShape="0">
                     <a:schemeClr val="bg2"/>
@@ -1773,7 +1773,7 @@
               <a:pPr>
                 <a:defRPr/>
               </a:pPr>
-              <a:t>‹#›</a:t>
+              <a:t>‹Nr.›</a:t>
             </a:fld>
             <a:endParaRPr lang="en-US"/>
           </a:p>
@@ -1909,14 +1909,14 @@
           </a:ln>
           <a:extLst>
             <a:ext uri="{909E8E84-426E-40dd-AFC4-6F175D3DCCD1}">
-              <a14:hiddenFill xmlns:a14="http://schemas.microsoft.com/office/drawing/2010/main" xmlns="">
+              <a14:hiddenFill xmlns="" xmlns:a14="http://schemas.microsoft.com/office/drawing/2010/main">
                 <a:solidFill>
                   <a:srgbClr val="FFFFFF"/>
                 </a:solidFill>
               </a14:hiddenFill>
             </a:ext>
             <a:ext uri="{91240B29-F687-4f45-9708-019B960494DF}">
-              <a14:hiddenLine xmlns:a14="http://schemas.microsoft.com/office/drawing/2010/main" xmlns="" w="9525">
+              <a14:hiddenLine xmlns="" xmlns:a14="http://schemas.microsoft.com/office/drawing/2010/main" w="9525">
                 <a:solidFill>
                   <a:srgbClr val="000000"/>
                 </a:solidFill>
@@ -1954,7 +1954,7 @@
           </a:ln>
           <a:extLst>
             <a:ext uri="{91240B29-F687-4f45-9708-019B960494DF}">
-              <a14:hiddenLine xmlns:a14="http://schemas.microsoft.com/office/drawing/2010/main" xmlns="" w="9525">
+              <a14:hiddenLine xmlns="" xmlns:a14="http://schemas.microsoft.com/office/drawing/2010/main" w="9525">
                 <a:solidFill>
                   <a:srgbClr val="000000"/>
                 </a:solidFill>
@@ -1997,14 +1997,14 @@
           </a:ln>
           <a:extLst>
             <a:ext uri="{909E8E84-426E-40dd-AFC4-6F175D3DCCD1}">
-              <a14:hiddenFill xmlns:a14="http://schemas.microsoft.com/office/drawing/2010/main" xmlns="">
+              <a14:hiddenFill xmlns="" xmlns:a14="http://schemas.microsoft.com/office/drawing/2010/main">
                 <a:solidFill>
                   <a:srgbClr val="FFFFFF"/>
                 </a:solidFill>
               </a14:hiddenFill>
             </a:ext>
             <a:ext uri="{91240B29-F687-4f45-9708-019B960494DF}">
-              <a14:hiddenLine xmlns:a14="http://schemas.microsoft.com/office/drawing/2010/main" xmlns="" w="9525">
+              <a14:hiddenLine xmlns="" xmlns:a14="http://schemas.microsoft.com/office/drawing/2010/main" w="9525">
                 <a:solidFill>
                   <a:srgbClr val="000000"/>
                 </a:solidFill>
@@ -2238,7 +2238,7 @@
               <a:pPr>
                 <a:defRPr/>
               </a:pPr>
-              <a:t>‹#›</a:t>
+              <a:t>‹Nr.›</a:t>
             </a:fld>
             <a:endParaRPr lang="en-US"/>
           </a:p>
@@ -2268,14 +2268,14 @@
           </a:ln>
           <a:extLst>
             <a:ext uri="{909E8E84-426E-40dd-AFC4-6F175D3DCCD1}">
-              <a14:hiddenFill xmlns:a14="http://schemas.microsoft.com/office/drawing/2010/main" xmlns="">
+              <a14:hiddenFill xmlns="" xmlns:a14="http://schemas.microsoft.com/office/drawing/2010/main">
                 <a:solidFill>
                   <a:srgbClr val="FFFFFF"/>
                 </a:solidFill>
               </a14:hiddenFill>
             </a:ext>
             <a:ext uri="{91240B29-F687-4f45-9708-019B960494DF}">
-              <a14:hiddenLine xmlns:a14="http://schemas.microsoft.com/office/drawing/2010/main" xmlns="" w="9525">
+              <a14:hiddenLine xmlns="" xmlns:a14="http://schemas.microsoft.com/office/drawing/2010/main" w="9525">
                 <a:solidFill>
                   <a:srgbClr val="000000"/>
                 </a:solidFill>
@@ -2912,7 +2912,19 @@
               <a:rPr lang="en-US" sz="1600" dirty="0">
                 <a:latin typeface="Arial" pitchFamily="34" charset="0"/>
               </a:rPr>
-              <a:t>, Florian X, Nancy X, Liane X, Christoph Wagner</a:t>
+              <a:t>, Florian X, Nancy X, </a:t>
+            </a:r>
+            <a:r>
+              <a:rPr lang="en-US" sz="1600">
+                <a:latin typeface="Arial" pitchFamily="34" charset="0"/>
+              </a:rPr>
+              <a:t>Liane Gybas, </a:t>
+            </a:r>
+            <a:r>
+              <a:rPr lang="en-US" sz="1600" dirty="0">
+                <a:latin typeface="Arial" pitchFamily="34" charset="0"/>
+              </a:rPr>
+              <a:t>Christoph Wagner</a:t>
             </a:r>
           </a:p>
           <a:p>
@@ -3568,11 +3580,7 @@
             </a:r>
             <a:r>
               <a:rPr lang="de-DE" sz="1200" dirty="0"/>
-              <a:t>: competitor</a:t>
-            </a:r>
-            <a:r>
-              <a:rPr lang="de-DE" sz="1200" dirty="0"/>
-              <a:t>Price / </a:t>
+              <a:t>: competitorPrice / </a:t>
             </a:r>
             <a:r>
               <a:rPr lang="de-DE" sz="1200" dirty="0" err="1"/>
@@ -20613,14 +20621,14 @@
           </a:ln>
           <a:extLst>
             <a:ext uri="{909E8E84-426E-40dd-AFC4-6F175D3DCCD1}">
-              <a14:hiddenFill xmlns:a14="http://schemas.microsoft.com/office/drawing/2010/main" xmlns="">
+              <a14:hiddenFill xmlns="" xmlns:a14="http://schemas.microsoft.com/office/drawing/2010/main">
                 <a:solidFill>
                   <a:srgbClr val="FFFFFF"/>
                 </a:solidFill>
               </a14:hiddenFill>
             </a:ext>
             <a:ext uri="{91240B29-F687-4f45-9708-019B960494DF}">
-              <a14:hiddenLine xmlns:a14="http://schemas.microsoft.com/office/drawing/2010/main" xmlns="" w="9525">
+              <a14:hiddenLine xmlns="" xmlns:a14="http://schemas.microsoft.com/office/drawing/2010/main" w="9525">
                 <a:solidFill>
                   <a:srgbClr val="000000"/>
                 </a:solidFill>
@@ -23350,14 +23358,14 @@
           </a:ln>
           <a:extLst>
             <a:ext uri="{909E8E84-426E-40dd-AFC4-6F175D3DCCD1}">
-              <a14:hiddenFill xmlns:a14="http://schemas.microsoft.com/office/drawing/2010/main" xmlns="">
+              <a14:hiddenFill xmlns="" xmlns:a14="http://schemas.microsoft.com/office/drawing/2010/main">
                 <a:solidFill>
                   <a:srgbClr val="FFFFFF"/>
                 </a:solidFill>
               </a14:hiddenFill>
             </a:ext>
             <a:ext uri="{91240B29-F687-4f45-9708-019B960494DF}">
-              <a14:hiddenLine xmlns:a14="http://schemas.microsoft.com/office/drawing/2010/main" xmlns="" w="9525">
+              <a14:hiddenLine xmlns="" xmlns:a14="http://schemas.microsoft.com/office/drawing/2010/main" w="9525">
                 <a:solidFill>
                   <a:srgbClr val="000000"/>
                 </a:solidFill>
@@ -23822,9 +23830,6 @@
                         </a:rPr>
                         <a:t>Value</a:t>
                       </a:r>
-                      <a:endParaRPr lang="de-DE" sz="1200" b="1" dirty="0">
-                        <a:effectLst/>
-                      </a:endParaRPr>
                     </a:p>
                   </a:txBody>
                   <a:tcPr marL="123825" marR="123825" marT="57150" marB="57150" anchor="ctr">
@@ -26838,21 +26843,6 @@
 </file>
 
 <file path=customXml/item1.xml><?xml version="1.0" encoding="utf-8"?>
-<p:properties xmlns:p="http://schemas.microsoft.com/office/2006/metadata/properties" xmlns:xsi="http://www.w3.org/2001/XMLSchema-instance" xmlns:pc="http://schemas.microsoft.com/office/infopath/2007/PartnerControls">
-  <documentManagement/>
-</p:properties>
-</file>
-
-<file path=customXml/item2.xml><?xml version="1.0" encoding="utf-8"?>
-<?mso-contentType ?>
-<FormTemplates xmlns="http://schemas.microsoft.com/sharepoint/v3/contenttype/forms">
-  <Display>DocumentLibraryForm</Display>
-  <Edit>DocumentLibraryForm</Edit>
-  <New>DocumentLibraryForm</New>
-</FormTemplates>
-</file>
-
-<file path=customXml/item3.xml><?xml version="1.0" encoding="utf-8"?>
 <ct:contentTypeSchema xmlns:ct="http://schemas.microsoft.com/office/2006/metadata/contentType" xmlns:ma="http://schemas.microsoft.com/office/2006/metadata/properties/metaAttributes" ct:_="" ma:_="" ma:contentTypeName="Dokument" ma:contentTypeID="0x01010019E6933ED8993F4DBB8494B5A1A4C25A" ma:contentTypeVersion="0" ma:contentTypeDescription="Ein neues Dokument erstellen." ma:contentTypeScope="" ma:versionID="e677f798020e71798772a150fa1c9db8">
   <xsd:schema xmlns:xsd="http://www.w3.org/2001/XMLSchema" xmlns:xs="http://www.w3.org/2001/XMLSchema" xmlns:p="http://schemas.microsoft.com/office/2006/metadata/properties" targetNamespace="http://schemas.microsoft.com/office/2006/metadata/properties" ma:root="true" ma:fieldsID="66c4a6dd5ef775a5269b08f7de37f93f">
     <xsd:element name="properties">
@@ -26966,17 +26956,33 @@
 </ct:contentTypeSchema>
 </file>
 
+<file path=customXml/item2.xml><?xml version="1.0" encoding="utf-8"?>
+<?mso-contentType ?>
+<FormTemplates xmlns="http://schemas.microsoft.com/sharepoint/v3/contenttype/forms">
+  <Display>DocumentLibraryForm</Display>
+  <Edit>DocumentLibraryForm</Edit>
+  <New>DocumentLibraryForm</New>
+</FormTemplates>
+</file>
+
+<file path=customXml/item3.xml><?xml version="1.0" encoding="utf-8"?>
+<p:properties xmlns:p="http://schemas.microsoft.com/office/2006/metadata/properties" xmlns:xsi="http://www.w3.org/2001/XMLSchema-instance" xmlns:pc="http://schemas.microsoft.com/office/infopath/2007/PartnerControls">
+  <documentManagement/>
+</p:properties>
+</file>
+
 <file path=customXml/itemProps1.xml><?xml version="1.0" encoding="utf-8"?>
-<ds:datastoreItem xmlns:ds="http://schemas.openxmlformats.org/officeDocument/2006/customXml" ds:itemID="{0AC038A6-0C52-4431-AA9D-2B6D9E759E25}">
+<ds:datastoreItem xmlns:ds="http://schemas.openxmlformats.org/officeDocument/2006/customXml" ds:itemID="{60E33035-A61E-484C-A48B-228D2BEE31A1}">
   <ds:schemaRefs>
-    <ds:schemaRef ds:uri="http://schemas.microsoft.com/office/2006/documentManagement/types"/>
+    <ds:schemaRef ds:uri="http://schemas.microsoft.com/office/2006/metadata/contentType"/>
+    <ds:schemaRef ds:uri="http://schemas.microsoft.com/office/2006/metadata/properties/metaAttributes"/>
+    <ds:schemaRef ds:uri="http://www.w3.org/2001/XMLSchema"/>
     <ds:schemaRef ds:uri="http://schemas.microsoft.com/office/2006/metadata/properties"/>
+    <ds:schemaRef ds:uri="http://schemas.openxmlformats.org/package/2006/metadata/core-properties"/>
+    <ds:schemaRef ds:uri="http://purl.org/dc/elements/1.1/"/>
     <ds:schemaRef ds:uri="http://purl.org/dc/terms/"/>
-    <ds:schemaRef ds:uri="http://schemas.openxmlformats.org/package/2006/metadata/core-properties"/>
-    <ds:schemaRef ds:uri="http://purl.org/dc/dcmitype/"/>
+    <ds:schemaRef ds:uri="http://schemas.microsoft.com/internal/obd"/>
     <ds:schemaRef ds:uri="http://schemas.microsoft.com/office/infopath/2007/PartnerControls"/>
-    <ds:schemaRef ds:uri="http://www.w3.org/XML/1998/namespace"/>
-    <ds:schemaRef ds:uri="http://purl.org/dc/elements/1.1/"/>
   </ds:schemaRefs>
 </ds:datastoreItem>
 </file>
@@ -26990,17 +26996,16 @@
 </file>
 
 <file path=customXml/itemProps3.xml><?xml version="1.0" encoding="utf-8"?>
-<ds:datastoreItem xmlns:ds="http://schemas.openxmlformats.org/officeDocument/2006/customXml" ds:itemID="{60E33035-A61E-484C-A48B-228D2BEE31A1}">
+<ds:datastoreItem xmlns:ds="http://schemas.openxmlformats.org/officeDocument/2006/customXml" ds:itemID="{0AC038A6-0C52-4431-AA9D-2B6D9E759E25}">
   <ds:schemaRefs>
-    <ds:schemaRef ds:uri="http://schemas.microsoft.com/office/2006/metadata/contentType"/>
-    <ds:schemaRef ds:uri="http://schemas.microsoft.com/office/2006/metadata/properties/metaAttributes"/>
-    <ds:schemaRef ds:uri="http://www.w3.org/2001/XMLSchema"/>
+    <ds:schemaRef ds:uri="http://schemas.microsoft.com/office/2006/documentManagement/types"/>
     <ds:schemaRef ds:uri="http://schemas.microsoft.com/office/2006/metadata/properties"/>
+    <ds:schemaRef ds:uri="http://purl.org/dc/terms/"/>
     <ds:schemaRef ds:uri="http://schemas.openxmlformats.org/package/2006/metadata/core-properties"/>
+    <ds:schemaRef ds:uri="http://purl.org/dc/dcmitype/"/>
+    <ds:schemaRef ds:uri="http://schemas.microsoft.com/office/infopath/2007/PartnerControls"/>
+    <ds:schemaRef ds:uri="http://www.w3.org/XML/1998/namespace"/>
     <ds:schemaRef ds:uri="http://purl.org/dc/elements/1.1/"/>
-    <ds:schemaRef ds:uri="http://purl.org/dc/terms/"/>
-    <ds:schemaRef ds:uri="http://schemas.microsoft.com/internal/obd"/>
-    <ds:schemaRef ds:uri="http://schemas.microsoft.com/office/infopath/2007/PartnerControls"/>
   </ds:schemaRefs>
 </ds:datastoreItem>
 </file>
</xml_diff>